<commit_message>
update coverpage for 002
</commit_message>
<xml_diff>
--- a/Learning Octave through Practicing.pptx
+++ b/Learning Octave through Practicing.pptx
@@ -5,13 +5,14 @@
     <p:sldMasterId id="2147483669" r:id="rId4"/>
   </p:sldMasterIdLst>
   <p:notesMasterIdLst>
-    <p:notesMasterId r:id="rId6"/>
+    <p:notesMasterId r:id="rId7"/>
   </p:notesMasterIdLst>
   <p:handoutMasterIdLst>
-    <p:handoutMasterId r:id="rId7"/>
+    <p:handoutMasterId r:id="rId8"/>
   </p:handoutMasterIdLst>
   <p:sldIdLst>
     <p:sldId id="256" r:id="rId5"/>
+    <p:sldId id="257" r:id="rId6"/>
   </p:sldIdLst>
   <p:sldSz cx="12192000" cy="6858000"/>
   <p:notesSz cx="6858000" cy="9144000"/>
@@ -215,7 +216,7 @@
           <a:p>
             <a:fld id="{2B85766F-5EC0-4797-B4D1-777FCB005B11}" type="datetimeFigureOut">
               <a:rPr lang="en-US" smtClean="0"/>
-              <a:t>10/27/2023</a:t>
+              <a:t>10/28/2023</a:t>
             </a:fld>
             <a:endParaRPr lang="en-US" dirty="0"/>
           </a:p>
@@ -392,7 +393,7 @@
           <a:p>
             <a:fld id="{B2B4B5EC-152C-4627-80C0-63B10D5574EF}" type="datetimeFigureOut">
               <a:rPr lang="en-US" smtClean="0"/>
-              <a:t>10/27/2023</a:t>
+              <a:t>10/28/2023</a:t>
             </a:fld>
             <a:endParaRPr lang="en-US" dirty="0"/>
           </a:p>
@@ -716,7 +717,7 @@
           <a:noFill/>
           <a:extLst>
             <a:ext uri="{909E8E84-426E-40dd-AFC4-6F175D3DCCD1}">
-              <a14:hiddenFill xmlns="" xmlns:a14="http://schemas.microsoft.com/office/drawing/2010/main">
+              <a14:hiddenFill xmlns:a14="http://schemas.microsoft.com/office/drawing/2010/main" xmlns="">
                 <a:solidFill>
                   <a:srgbClr val="FFFFFF"/>
                 </a:solidFill>
@@ -775,7 +776,7 @@
             </a:ln>
             <a:extLst>
               <a:ext uri="{91240B29-F687-4f45-9708-019B960494DF}">
-                <a14:hiddenLine xmlns="" xmlns:a14="http://schemas.microsoft.com/office/drawing/2010/main" w="9525">
+                <a14:hiddenLine xmlns:a14="http://schemas.microsoft.com/office/drawing/2010/main" xmlns="" w="9525">
                   <a:solidFill>
                     <a:srgbClr val="000000"/>
                   </a:solidFill>
@@ -865,7 +866,7 @@
             </a:ln>
             <a:extLst>
               <a:ext uri="{91240B29-F687-4f45-9708-019B960494DF}">
-                <a14:hiddenLine xmlns="" xmlns:a14="http://schemas.microsoft.com/office/drawing/2010/main" w="9525">
+                <a14:hiddenLine xmlns:a14="http://schemas.microsoft.com/office/drawing/2010/main" xmlns="" w="9525">
                   <a:solidFill>
                     <a:srgbClr val="000000"/>
                   </a:solidFill>
@@ -955,7 +956,7 @@
             </a:ln>
             <a:extLst>
               <a:ext uri="{91240B29-F687-4f45-9708-019B960494DF}">
-                <a14:hiddenLine xmlns="" xmlns:a14="http://schemas.microsoft.com/office/drawing/2010/main" w="9525">
+                <a14:hiddenLine xmlns:a14="http://schemas.microsoft.com/office/drawing/2010/main" xmlns="" w="9525">
                   <a:solidFill>
                     <a:srgbClr val="000000"/>
                   </a:solidFill>
@@ -989,7 +990,7 @@
             </a:ln>
             <a:extLst>
               <a:ext uri="{91240B29-F687-4f45-9708-019B960494DF}">
-                <a14:hiddenLine xmlns="" xmlns:a14="http://schemas.microsoft.com/office/drawing/2010/main" w="9525">
+                <a14:hiddenLine xmlns:a14="http://schemas.microsoft.com/office/drawing/2010/main" xmlns="" w="9525">
                   <a:solidFill>
                     <a:srgbClr val="000000"/>
                   </a:solidFill>
@@ -1079,7 +1080,7 @@
             </a:ln>
             <a:extLst>
               <a:ext uri="{91240B29-F687-4f45-9708-019B960494DF}">
-                <a14:hiddenLine xmlns="" xmlns:a14="http://schemas.microsoft.com/office/drawing/2010/main" w="9525">
+                <a14:hiddenLine xmlns:a14="http://schemas.microsoft.com/office/drawing/2010/main" xmlns="" w="9525">
                   <a:solidFill>
                     <a:srgbClr val="000000"/>
                   </a:solidFill>
@@ -1141,7 +1142,7 @@
             </a:ln>
             <a:extLst>
               <a:ext uri="{91240B29-F687-4f45-9708-019B960494DF}">
-                <a14:hiddenLine xmlns="" xmlns:a14="http://schemas.microsoft.com/office/drawing/2010/main" w="9525">
+                <a14:hiddenLine xmlns:a14="http://schemas.microsoft.com/office/drawing/2010/main" xmlns="" w="9525">
                   <a:solidFill>
                     <a:srgbClr val="000000"/>
                   </a:solidFill>
@@ -1203,7 +1204,7 @@
             </a:ln>
             <a:extLst>
               <a:ext uri="{91240B29-F687-4f45-9708-019B960494DF}">
-                <a14:hiddenLine xmlns="" xmlns:a14="http://schemas.microsoft.com/office/drawing/2010/main" w="9525">
+                <a14:hiddenLine xmlns:a14="http://schemas.microsoft.com/office/drawing/2010/main" xmlns="" w="9525">
                   <a:solidFill>
                     <a:srgbClr val="000000"/>
                   </a:solidFill>
@@ -1293,7 +1294,7 @@
             </a:ln>
             <a:extLst>
               <a:ext uri="{91240B29-F687-4f45-9708-019B960494DF}">
-                <a14:hiddenLine xmlns="" xmlns:a14="http://schemas.microsoft.com/office/drawing/2010/main" w="9525">
+                <a14:hiddenLine xmlns:a14="http://schemas.microsoft.com/office/drawing/2010/main" xmlns="" w="9525">
                   <a:solidFill>
                     <a:srgbClr val="000000"/>
                   </a:solidFill>
@@ -1355,7 +1356,7 @@
             </a:ln>
             <a:extLst>
               <a:ext uri="{91240B29-F687-4f45-9708-019B960494DF}">
-                <a14:hiddenLine xmlns="" xmlns:a14="http://schemas.microsoft.com/office/drawing/2010/main" w="9525">
+                <a14:hiddenLine xmlns:a14="http://schemas.microsoft.com/office/drawing/2010/main" xmlns="" w="9525">
                   <a:solidFill>
                     <a:srgbClr val="000000"/>
                   </a:solidFill>
@@ -1417,7 +1418,7 @@
             </a:ln>
             <a:extLst>
               <a:ext uri="{91240B29-F687-4f45-9708-019B960494DF}">
-                <a14:hiddenLine xmlns="" xmlns:a14="http://schemas.microsoft.com/office/drawing/2010/main" w="9525">
+                <a14:hiddenLine xmlns:a14="http://schemas.microsoft.com/office/drawing/2010/main" xmlns="" w="9525">
                   <a:solidFill>
                     <a:srgbClr val="000000"/>
                   </a:solidFill>
@@ -1507,7 +1508,7 @@
             </a:ln>
             <a:extLst>
               <a:ext uri="{91240B29-F687-4f45-9708-019B960494DF}">
-                <a14:hiddenLine xmlns="" xmlns:a14="http://schemas.microsoft.com/office/drawing/2010/main" w="9525">
+                <a14:hiddenLine xmlns:a14="http://schemas.microsoft.com/office/drawing/2010/main" xmlns="" w="9525">
                   <a:solidFill>
                     <a:srgbClr val="000000"/>
                   </a:solidFill>
@@ -1597,7 +1598,7 @@
             </a:ln>
             <a:extLst>
               <a:ext uri="{91240B29-F687-4f45-9708-019B960494DF}">
-                <a14:hiddenLine xmlns="" xmlns:a14="http://schemas.microsoft.com/office/drawing/2010/main" w="9525">
+                <a14:hiddenLine xmlns:a14="http://schemas.microsoft.com/office/drawing/2010/main" xmlns="" w="9525">
                   <a:solidFill>
                     <a:srgbClr val="000000"/>
                   </a:solidFill>
@@ -1659,7 +1660,7 @@
             </a:ln>
             <a:extLst>
               <a:ext uri="{91240B29-F687-4f45-9708-019B960494DF}">
-                <a14:hiddenLine xmlns="" xmlns:a14="http://schemas.microsoft.com/office/drawing/2010/main" w="9525">
+                <a14:hiddenLine xmlns:a14="http://schemas.microsoft.com/office/drawing/2010/main" xmlns="" w="9525">
                   <a:solidFill>
                     <a:srgbClr val="000000"/>
                   </a:solidFill>
@@ -1769,7 +1770,7 @@
             </a:ln>
             <a:extLst>
               <a:ext uri="{91240B29-F687-4f45-9708-019B960494DF}">
-                <a14:hiddenLine xmlns="" xmlns:a14="http://schemas.microsoft.com/office/drawing/2010/main" w="9525">
+                <a14:hiddenLine xmlns:a14="http://schemas.microsoft.com/office/drawing/2010/main" xmlns="" w="9525">
                   <a:solidFill>
                     <a:srgbClr val="000000"/>
                   </a:solidFill>
@@ -1831,7 +1832,7 @@
             </a:ln>
             <a:extLst>
               <a:ext uri="{91240B29-F687-4f45-9708-019B960494DF}">
-                <a14:hiddenLine xmlns="" xmlns:a14="http://schemas.microsoft.com/office/drawing/2010/main" w="9525">
+                <a14:hiddenLine xmlns:a14="http://schemas.microsoft.com/office/drawing/2010/main" xmlns="" w="9525">
                   <a:solidFill>
                     <a:srgbClr val="000000"/>
                   </a:solidFill>
@@ -1921,7 +1922,7 @@
             </a:ln>
             <a:extLst>
               <a:ext uri="{91240B29-F687-4f45-9708-019B960494DF}">
-                <a14:hiddenLine xmlns="" xmlns:a14="http://schemas.microsoft.com/office/drawing/2010/main" w="9525">
+                <a14:hiddenLine xmlns:a14="http://schemas.microsoft.com/office/drawing/2010/main" xmlns="" w="9525">
                   <a:solidFill>
                     <a:srgbClr val="000000"/>
                   </a:solidFill>
@@ -2011,7 +2012,7 @@
             </a:ln>
             <a:extLst>
               <a:ext uri="{91240B29-F687-4f45-9708-019B960494DF}">
-                <a14:hiddenLine xmlns="" xmlns:a14="http://schemas.microsoft.com/office/drawing/2010/main" w="9525">
+                <a14:hiddenLine xmlns:a14="http://schemas.microsoft.com/office/drawing/2010/main" xmlns="" w="9525">
                   <a:solidFill>
                     <a:srgbClr val="000000"/>
                   </a:solidFill>
@@ -2073,7 +2074,7 @@
             </a:ln>
             <a:extLst>
               <a:ext uri="{91240B29-F687-4f45-9708-019B960494DF}">
-                <a14:hiddenLine xmlns="" xmlns:a14="http://schemas.microsoft.com/office/drawing/2010/main" w="9525">
+                <a14:hiddenLine xmlns:a14="http://schemas.microsoft.com/office/drawing/2010/main" xmlns="" w="9525">
                   <a:solidFill>
                     <a:srgbClr val="000000"/>
                   </a:solidFill>
@@ -2163,7 +2164,7 @@
             </a:ln>
             <a:extLst>
               <a:ext uri="{91240B29-F687-4f45-9708-019B960494DF}">
-                <a14:hiddenLine xmlns="" xmlns:a14="http://schemas.microsoft.com/office/drawing/2010/main" w="9525">
+                <a14:hiddenLine xmlns:a14="http://schemas.microsoft.com/office/drawing/2010/main" xmlns="" w="9525">
                   <a:solidFill>
                     <a:srgbClr val="000000"/>
                   </a:solidFill>
@@ -2253,7 +2254,7 @@
             </a:ln>
             <a:extLst>
               <a:ext uri="{91240B29-F687-4f45-9708-019B960494DF}">
-                <a14:hiddenLine xmlns="" xmlns:a14="http://schemas.microsoft.com/office/drawing/2010/main" w="9525">
+                <a14:hiddenLine xmlns:a14="http://schemas.microsoft.com/office/drawing/2010/main" xmlns="" w="9525">
                   <a:solidFill>
                     <a:srgbClr val="000000"/>
                   </a:solidFill>
@@ -2309,7 +2310,7 @@
             </a:ln>
             <a:extLst>
               <a:ext uri="{91240B29-F687-4f45-9708-019B960494DF}">
-                <a14:hiddenLine xmlns="" xmlns:a14="http://schemas.microsoft.com/office/drawing/2010/main" w="9525">
+                <a14:hiddenLine xmlns:a14="http://schemas.microsoft.com/office/drawing/2010/main" xmlns="" w="9525">
                   <a:solidFill>
                     <a:srgbClr val="000000"/>
                   </a:solidFill>
@@ -2399,7 +2400,7 @@
             </a:ln>
             <a:extLst>
               <a:ext uri="{91240B29-F687-4f45-9708-019B960494DF}">
-                <a14:hiddenLine xmlns="" xmlns:a14="http://schemas.microsoft.com/office/drawing/2010/main" w="9525">
+                <a14:hiddenLine xmlns:a14="http://schemas.microsoft.com/office/drawing/2010/main" xmlns="" w="9525">
                   <a:solidFill>
                     <a:srgbClr val="000000"/>
                   </a:solidFill>
@@ -2455,7 +2456,7 @@
             </a:ln>
             <a:extLst>
               <a:ext uri="{91240B29-F687-4f45-9708-019B960494DF}">
-                <a14:hiddenLine xmlns="" xmlns:a14="http://schemas.microsoft.com/office/drawing/2010/main" w="9525">
+                <a14:hiddenLine xmlns:a14="http://schemas.microsoft.com/office/drawing/2010/main" xmlns="" w="9525">
                   <a:solidFill>
                     <a:srgbClr val="000000"/>
                   </a:solidFill>
@@ -2545,7 +2546,7 @@
             </a:ln>
             <a:extLst>
               <a:ext uri="{91240B29-F687-4f45-9708-019B960494DF}">
-                <a14:hiddenLine xmlns="" xmlns:a14="http://schemas.microsoft.com/office/drawing/2010/main" w="9525">
+                <a14:hiddenLine xmlns:a14="http://schemas.microsoft.com/office/drawing/2010/main" xmlns="" w="9525">
                   <a:solidFill>
                     <a:srgbClr val="000000"/>
                   </a:solidFill>
@@ -2613,7 +2614,7 @@
             </a:ln>
             <a:extLst>
               <a:ext uri="{91240B29-F687-4f45-9708-019B960494DF}">
-                <a14:hiddenLine xmlns="" xmlns:a14="http://schemas.microsoft.com/office/drawing/2010/main" w="9525">
+                <a14:hiddenLine xmlns:a14="http://schemas.microsoft.com/office/drawing/2010/main" xmlns="" w="9525">
                   <a:solidFill>
                     <a:srgbClr val="000000"/>
                   </a:solidFill>
@@ -2703,7 +2704,7 @@
             </a:ln>
             <a:extLst>
               <a:ext uri="{91240B29-F687-4f45-9708-019B960494DF}">
-                <a14:hiddenLine xmlns="" xmlns:a14="http://schemas.microsoft.com/office/drawing/2010/main" w="9525">
+                <a14:hiddenLine xmlns:a14="http://schemas.microsoft.com/office/drawing/2010/main" xmlns="" w="9525">
                   <a:solidFill>
                     <a:srgbClr val="000000"/>
                   </a:solidFill>
@@ -2771,7 +2772,7 @@
             </a:ln>
             <a:extLst>
               <a:ext uri="{91240B29-F687-4f45-9708-019B960494DF}">
-                <a14:hiddenLine xmlns="" xmlns:a14="http://schemas.microsoft.com/office/drawing/2010/main" w="9525">
+                <a14:hiddenLine xmlns:a14="http://schemas.microsoft.com/office/drawing/2010/main" xmlns="" w="9525">
                   <a:solidFill>
                     <a:srgbClr val="000000"/>
                   </a:solidFill>
@@ -2861,7 +2862,7 @@
             </a:ln>
             <a:extLst>
               <a:ext uri="{91240B29-F687-4f45-9708-019B960494DF}">
-                <a14:hiddenLine xmlns="" xmlns:a14="http://schemas.microsoft.com/office/drawing/2010/main" w="9525">
+                <a14:hiddenLine xmlns:a14="http://schemas.microsoft.com/office/drawing/2010/main" xmlns="" w="9525">
                   <a:solidFill>
                     <a:srgbClr val="000000"/>
                   </a:solidFill>
@@ -2895,7 +2896,7 @@
             </a:ln>
             <a:extLst>
               <a:ext uri="{91240B29-F687-4f45-9708-019B960494DF}">
-                <a14:hiddenLine xmlns="" xmlns:a14="http://schemas.microsoft.com/office/drawing/2010/main" w="9525">
+                <a14:hiddenLine xmlns:a14="http://schemas.microsoft.com/office/drawing/2010/main" xmlns="" w="9525">
                   <a:solidFill>
                     <a:srgbClr val="000000"/>
                   </a:solidFill>
@@ -2985,7 +2986,7 @@
             </a:ln>
             <a:extLst>
               <a:ext uri="{91240B29-F687-4f45-9708-019B960494DF}">
-                <a14:hiddenLine xmlns="" xmlns:a14="http://schemas.microsoft.com/office/drawing/2010/main" w="9525">
+                <a14:hiddenLine xmlns:a14="http://schemas.microsoft.com/office/drawing/2010/main" xmlns="" w="9525">
                   <a:solidFill>
                     <a:srgbClr val="000000"/>
                   </a:solidFill>
@@ -3047,7 +3048,7 @@
             </a:ln>
             <a:extLst>
               <a:ext uri="{91240B29-F687-4f45-9708-019B960494DF}">
-                <a14:hiddenLine xmlns="" xmlns:a14="http://schemas.microsoft.com/office/drawing/2010/main" w="9525">
+                <a14:hiddenLine xmlns:a14="http://schemas.microsoft.com/office/drawing/2010/main" xmlns="" w="9525">
                   <a:solidFill>
                     <a:srgbClr val="000000"/>
                   </a:solidFill>
@@ -3109,7 +3110,7 @@
             </a:ln>
             <a:extLst>
               <a:ext uri="{91240B29-F687-4f45-9708-019B960494DF}">
-                <a14:hiddenLine xmlns="" xmlns:a14="http://schemas.microsoft.com/office/drawing/2010/main" w="9525">
+                <a14:hiddenLine xmlns:a14="http://schemas.microsoft.com/office/drawing/2010/main" xmlns="" w="9525">
                   <a:solidFill>
                     <a:srgbClr val="000000"/>
                   </a:solidFill>
@@ -3199,7 +3200,7 @@
             </a:ln>
             <a:extLst>
               <a:ext uri="{91240B29-F687-4f45-9708-019B960494DF}">
-                <a14:hiddenLine xmlns="" xmlns:a14="http://schemas.microsoft.com/office/drawing/2010/main" w="9525">
+                <a14:hiddenLine xmlns:a14="http://schemas.microsoft.com/office/drawing/2010/main" xmlns="" w="9525">
                   <a:solidFill>
                     <a:srgbClr val="000000"/>
                   </a:solidFill>
@@ -3267,7 +3268,7 @@
             </a:ln>
             <a:extLst>
               <a:ext uri="{91240B29-F687-4f45-9708-019B960494DF}">
-                <a14:hiddenLine xmlns="" xmlns:a14="http://schemas.microsoft.com/office/drawing/2010/main" w="9525">
+                <a14:hiddenLine xmlns:a14="http://schemas.microsoft.com/office/drawing/2010/main" xmlns="" w="9525">
                   <a:solidFill>
                     <a:srgbClr val="000000"/>
                   </a:solidFill>
@@ -3329,7 +3330,7 @@
             </a:ln>
             <a:extLst>
               <a:ext uri="{91240B29-F687-4f45-9708-019B960494DF}">
-                <a14:hiddenLine xmlns="" xmlns:a14="http://schemas.microsoft.com/office/drawing/2010/main" w="9525">
+                <a14:hiddenLine xmlns:a14="http://schemas.microsoft.com/office/drawing/2010/main" xmlns="" w="9525">
                   <a:solidFill>
                     <a:srgbClr val="000000"/>
                   </a:solidFill>
@@ -3419,7 +3420,7 @@
             </a:ln>
             <a:extLst>
               <a:ext uri="{91240B29-F687-4f45-9708-019B960494DF}">
-                <a14:hiddenLine xmlns="" xmlns:a14="http://schemas.microsoft.com/office/drawing/2010/main" w="9525">
+                <a14:hiddenLine xmlns:a14="http://schemas.microsoft.com/office/drawing/2010/main" xmlns="" w="9525">
                   <a:solidFill>
                     <a:srgbClr val="000000"/>
                   </a:solidFill>
@@ -3481,7 +3482,7 @@
             </a:ln>
             <a:extLst>
               <a:ext uri="{91240B29-F687-4f45-9708-019B960494DF}">
-                <a14:hiddenLine xmlns="" xmlns:a14="http://schemas.microsoft.com/office/drawing/2010/main" w="9525">
+                <a14:hiddenLine xmlns:a14="http://schemas.microsoft.com/office/drawing/2010/main" xmlns="" w="9525">
                   <a:solidFill>
                     <a:srgbClr val="000000"/>
                   </a:solidFill>
@@ -3571,7 +3572,7 @@
             </a:ln>
             <a:extLst>
               <a:ext uri="{91240B29-F687-4f45-9708-019B960494DF}">
-                <a14:hiddenLine xmlns="" xmlns:a14="http://schemas.microsoft.com/office/drawing/2010/main" w="9525">
+                <a14:hiddenLine xmlns:a14="http://schemas.microsoft.com/office/drawing/2010/main" xmlns="" w="9525">
                   <a:solidFill>
                     <a:srgbClr val="000000"/>
                   </a:solidFill>
@@ -3633,7 +3634,7 @@
             </a:ln>
             <a:extLst>
               <a:ext uri="{91240B29-F687-4f45-9708-019B960494DF}">
-                <a14:hiddenLine xmlns="" xmlns:a14="http://schemas.microsoft.com/office/drawing/2010/main" w="9525">
+                <a14:hiddenLine xmlns:a14="http://schemas.microsoft.com/office/drawing/2010/main" xmlns="" w="9525">
                   <a:solidFill>
                     <a:srgbClr val="000000"/>
                   </a:solidFill>
@@ -3723,7 +3724,7 @@
             </a:ln>
             <a:extLst>
               <a:ext uri="{91240B29-F687-4f45-9708-019B960494DF}">
-                <a14:hiddenLine xmlns="" xmlns:a14="http://schemas.microsoft.com/office/drawing/2010/main" w="9525">
+                <a14:hiddenLine xmlns:a14="http://schemas.microsoft.com/office/drawing/2010/main" xmlns="" w="9525">
                   <a:solidFill>
                     <a:srgbClr val="000000"/>
                   </a:solidFill>
@@ -3757,7 +3758,7 @@
             </a:ln>
             <a:extLst>
               <a:ext uri="{91240B29-F687-4f45-9708-019B960494DF}">
-                <a14:hiddenLine xmlns="" xmlns:a14="http://schemas.microsoft.com/office/drawing/2010/main" w="9525">
+                <a14:hiddenLine xmlns:a14="http://schemas.microsoft.com/office/drawing/2010/main" xmlns="" w="9525">
                   <a:solidFill>
                     <a:srgbClr val="000000"/>
                   </a:solidFill>
@@ -3822,7 +3823,7 @@
             </a:ln>
             <a:extLst>
               <a:ext uri="{91240B29-F687-4f45-9708-019B960494DF}">
-                <a14:hiddenLine xmlns="" xmlns:a14="http://schemas.microsoft.com/office/drawing/2010/main" w="9525">
+                <a14:hiddenLine xmlns:a14="http://schemas.microsoft.com/office/drawing/2010/main" xmlns="" w="9525">
                   <a:solidFill>
                     <a:srgbClr val="000000"/>
                   </a:solidFill>
@@ -3912,7 +3913,7 @@
             </a:ln>
             <a:extLst>
               <a:ext uri="{91240B29-F687-4f45-9708-019B960494DF}">
-                <a14:hiddenLine xmlns="" xmlns:a14="http://schemas.microsoft.com/office/drawing/2010/main" w="9525">
+                <a14:hiddenLine xmlns:a14="http://schemas.microsoft.com/office/drawing/2010/main" xmlns="" w="9525">
                   <a:solidFill>
                     <a:srgbClr val="000000"/>
                   </a:solidFill>
@@ -3974,7 +3975,7 @@
             </a:ln>
             <a:extLst>
               <a:ext uri="{91240B29-F687-4f45-9708-019B960494DF}">
-                <a14:hiddenLine xmlns="" xmlns:a14="http://schemas.microsoft.com/office/drawing/2010/main" w="9525">
+                <a14:hiddenLine xmlns:a14="http://schemas.microsoft.com/office/drawing/2010/main" xmlns="" w="9525">
                   <a:solidFill>
                     <a:srgbClr val="000000"/>
                   </a:solidFill>
@@ -4064,7 +4065,7 @@
             </a:ln>
             <a:extLst>
               <a:ext uri="{91240B29-F687-4f45-9708-019B960494DF}">
-                <a14:hiddenLine xmlns="" xmlns:a14="http://schemas.microsoft.com/office/drawing/2010/main" w="9525">
+                <a14:hiddenLine xmlns:a14="http://schemas.microsoft.com/office/drawing/2010/main" xmlns="" w="9525">
                   <a:solidFill>
                     <a:srgbClr val="000000"/>
                   </a:solidFill>
@@ -4154,7 +4155,7 @@
             </a:ln>
             <a:extLst>
               <a:ext uri="{91240B29-F687-4f45-9708-019B960494DF}">
-                <a14:hiddenLine xmlns="" xmlns:a14="http://schemas.microsoft.com/office/drawing/2010/main" w="9525">
+                <a14:hiddenLine xmlns:a14="http://schemas.microsoft.com/office/drawing/2010/main" xmlns="" w="9525">
                   <a:solidFill>
                     <a:srgbClr val="000000"/>
                   </a:solidFill>
@@ -4219,7 +4220,7 @@
             </a:ln>
             <a:extLst>
               <a:ext uri="{91240B29-F687-4f45-9708-019B960494DF}">
-                <a14:hiddenLine xmlns="" xmlns:a14="http://schemas.microsoft.com/office/drawing/2010/main" w="9525">
+                <a14:hiddenLine xmlns:a14="http://schemas.microsoft.com/office/drawing/2010/main" xmlns="" w="9525">
                   <a:solidFill>
                     <a:srgbClr val="000000"/>
                   </a:solidFill>
@@ -4281,7 +4282,7 @@
             </a:ln>
             <a:extLst>
               <a:ext uri="{91240B29-F687-4f45-9708-019B960494DF}">
-                <a14:hiddenLine xmlns="" xmlns:a14="http://schemas.microsoft.com/office/drawing/2010/main" w="9525">
+                <a14:hiddenLine xmlns:a14="http://schemas.microsoft.com/office/drawing/2010/main" xmlns="" w="9525">
                   <a:solidFill>
                     <a:srgbClr val="000000"/>
                   </a:solidFill>
@@ -4371,7 +4372,7 @@
             </a:ln>
             <a:extLst>
               <a:ext uri="{91240B29-F687-4f45-9708-019B960494DF}">
-                <a14:hiddenLine xmlns="" xmlns:a14="http://schemas.microsoft.com/office/drawing/2010/main" w="9525">
+                <a14:hiddenLine xmlns:a14="http://schemas.microsoft.com/office/drawing/2010/main" xmlns="" w="9525">
                   <a:solidFill>
                     <a:srgbClr val="000000"/>
                   </a:solidFill>
@@ -4461,7 +4462,7 @@
             </a:ln>
             <a:extLst>
               <a:ext uri="{91240B29-F687-4f45-9708-019B960494DF}">
-                <a14:hiddenLine xmlns="" xmlns:a14="http://schemas.microsoft.com/office/drawing/2010/main" w="9525">
+                <a14:hiddenLine xmlns:a14="http://schemas.microsoft.com/office/drawing/2010/main" xmlns="" w="9525">
                   <a:solidFill>
                     <a:srgbClr val="000000"/>
                   </a:solidFill>
@@ -4523,7 +4524,7 @@
             </a:ln>
             <a:extLst>
               <a:ext uri="{91240B29-F687-4f45-9708-019B960494DF}">
-                <a14:hiddenLine xmlns="" xmlns:a14="http://schemas.microsoft.com/office/drawing/2010/main" w="9525">
+                <a14:hiddenLine xmlns:a14="http://schemas.microsoft.com/office/drawing/2010/main" xmlns="" w="9525">
                   <a:solidFill>
                     <a:srgbClr val="000000"/>
                   </a:solidFill>
@@ -4643,7 +4644,7 @@
             </a:ln>
             <a:extLst>
               <a:ext uri="{91240B29-F687-4f45-9708-019B960494DF}">
-                <a14:hiddenLine xmlns="" xmlns:a14="http://schemas.microsoft.com/office/drawing/2010/main" w="9525">
+                <a14:hiddenLine xmlns:a14="http://schemas.microsoft.com/office/drawing/2010/main" xmlns="" w="9525">
                   <a:solidFill>
                     <a:srgbClr val="000000"/>
                   </a:solidFill>
@@ -4711,7 +4712,7 @@
             </a:ln>
             <a:extLst>
               <a:ext uri="{91240B29-F687-4f45-9708-019B960494DF}">
-                <a14:hiddenLine xmlns="" xmlns:a14="http://schemas.microsoft.com/office/drawing/2010/main" w="9525">
+                <a14:hiddenLine xmlns:a14="http://schemas.microsoft.com/office/drawing/2010/main" xmlns="" w="9525">
                   <a:solidFill>
                     <a:srgbClr val="000000"/>
                   </a:solidFill>
@@ -4801,7 +4802,7 @@
             </a:ln>
             <a:extLst>
               <a:ext uri="{91240B29-F687-4f45-9708-019B960494DF}">
-                <a14:hiddenLine xmlns="" xmlns:a14="http://schemas.microsoft.com/office/drawing/2010/main" w="9525">
+                <a14:hiddenLine xmlns:a14="http://schemas.microsoft.com/office/drawing/2010/main" xmlns="" w="9525">
                   <a:solidFill>
                     <a:srgbClr val="000000"/>
                   </a:solidFill>
@@ -4941,7 +4942,7 @@
           <a:p>
             <a:fld id="{48A87A34-81AB-432B-8DAE-1953F412C126}" type="datetimeFigureOut">
               <a:rPr lang="en-US" smtClean="0"/>
-              <a:t>10/27/2023</a:t>
+              <a:t>10/28/2023</a:t>
             </a:fld>
             <a:endParaRPr lang="en-US" dirty="0"/>
           </a:p>
@@ -5208,7 +5209,7 @@
           <a:p>
             <a:fld id="{48A87A34-81AB-432B-8DAE-1953F412C126}" type="datetimeFigureOut">
               <a:rPr lang="en-US" smtClean="0"/>
-              <a:t>10/27/2023</a:t>
+              <a:t>10/28/2023</a:t>
             </a:fld>
             <a:endParaRPr lang="en-US" dirty="0"/>
           </a:p>
@@ -5404,7 +5405,7 @@
           <a:p>
             <a:fld id="{48A87A34-81AB-432B-8DAE-1953F412C126}" type="datetimeFigureOut">
               <a:rPr lang="en-US" smtClean="0"/>
-              <a:t>10/27/2023</a:t>
+              <a:t>10/28/2023</a:t>
             </a:fld>
             <a:endParaRPr lang="en-US" dirty="0"/>
           </a:p>
@@ -5667,7 +5668,7 @@
           <a:p>
             <a:fld id="{48A87A34-81AB-432B-8DAE-1953F412C126}" type="datetimeFigureOut">
               <a:rPr lang="en-US" smtClean="0"/>
-              <a:t>10/27/2023</a:t>
+              <a:t>10/28/2023</a:t>
             </a:fld>
             <a:endParaRPr lang="en-US" dirty="0"/>
           </a:p>
@@ -6101,7 +6102,7 @@
           <a:p>
             <a:fld id="{48A87A34-81AB-432B-8DAE-1953F412C126}" type="datetimeFigureOut">
               <a:rPr lang="en-US" smtClean="0"/>
-              <a:t>10/27/2023</a:t>
+              <a:t>10/28/2023</a:t>
             </a:fld>
             <a:endParaRPr lang="en-US" dirty="0"/>
           </a:p>
@@ -6647,7 +6648,7 @@
           <a:p>
             <a:fld id="{48A87A34-81AB-432B-8DAE-1953F412C126}" type="datetimeFigureOut">
               <a:rPr lang="en-US" smtClean="0"/>
-              <a:t>10/27/2023</a:t>
+              <a:t>10/28/2023</a:t>
             </a:fld>
             <a:endParaRPr lang="en-US" dirty="0"/>
           </a:p>
@@ -7367,7 +7368,7 @@
           <a:p>
             <a:fld id="{48A87A34-81AB-432B-8DAE-1953F412C126}" type="datetimeFigureOut">
               <a:rPr lang="en-US" smtClean="0"/>
-              <a:t>10/27/2023</a:t>
+              <a:t>10/28/2023</a:t>
             </a:fld>
             <a:endParaRPr lang="en-US" dirty="0"/>
           </a:p>
@@ -7537,7 +7538,7 @@
           <a:p>
             <a:fld id="{48A87A34-81AB-432B-8DAE-1953F412C126}" type="datetimeFigureOut">
               <a:rPr lang="en-US" smtClean="0"/>
-              <a:t>10/27/2023</a:t>
+              <a:t>10/28/2023</a:t>
             </a:fld>
             <a:endParaRPr lang="en-US" dirty="0"/>
           </a:p>
@@ -7717,7 +7718,7 @@
           <a:p>
             <a:fld id="{48A87A34-81AB-432B-8DAE-1953F412C126}" type="datetimeFigureOut">
               <a:rPr lang="en-US" smtClean="0"/>
-              <a:t>10/27/2023</a:t>
+              <a:t>10/28/2023</a:t>
             </a:fld>
             <a:endParaRPr lang="en-US" dirty="0"/>
           </a:p>
@@ -7887,7 +7888,7 @@
           <a:p>
             <a:fld id="{48A87A34-81AB-432B-8DAE-1953F412C126}" type="datetimeFigureOut">
               <a:rPr lang="en-US" smtClean="0"/>
-              <a:t>10/27/2023</a:t>
+              <a:t>10/28/2023</a:t>
             </a:fld>
             <a:endParaRPr lang="en-US" dirty="0"/>
           </a:p>
@@ -8137,7 +8138,7 @@
           <a:p>
             <a:fld id="{48A87A34-81AB-432B-8DAE-1953F412C126}" type="datetimeFigureOut">
               <a:rPr lang="en-US" smtClean="0"/>
-              <a:t>10/27/2023</a:t>
+              <a:t>10/28/2023</a:t>
             </a:fld>
             <a:endParaRPr lang="en-US" dirty="0"/>
           </a:p>
@@ -8369,7 +8370,7 @@
           <a:p>
             <a:fld id="{48A87A34-81AB-432B-8DAE-1953F412C126}" type="datetimeFigureOut">
               <a:rPr lang="en-US" smtClean="0"/>
-              <a:t>10/27/2023</a:t>
+              <a:t>10/28/2023</a:t>
             </a:fld>
             <a:endParaRPr lang="en-US" dirty="0"/>
           </a:p>
@@ -8750,7 +8751,7 @@
           <a:p>
             <a:fld id="{48A87A34-81AB-432B-8DAE-1953F412C126}" type="datetimeFigureOut">
               <a:rPr lang="en-US" smtClean="0"/>
-              <a:t>10/27/2023</a:t>
+              <a:t>10/28/2023</a:t>
             </a:fld>
             <a:endParaRPr lang="en-US" dirty="0"/>
           </a:p>
@@ -8868,7 +8869,7 @@
           <a:p>
             <a:fld id="{48A87A34-81AB-432B-8DAE-1953F412C126}" type="datetimeFigureOut">
               <a:rPr lang="en-US" smtClean="0"/>
-              <a:t>10/27/2023</a:t>
+              <a:t>10/28/2023</a:t>
             </a:fld>
             <a:endParaRPr lang="en-US" dirty="0"/>
           </a:p>
@@ -8963,7 +8964,7 @@
           <a:p>
             <a:fld id="{48A87A34-81AB-432B-8DAE-1953F412C126}" type="datetimeFigureOut">
               <a:rPr lang="en-US" smtClean="0"/>
-              <a:t>10/27/2023</a:t>
+              <a:t>10/28/2023</a:t>
             </a:fld>
             <a:endParaRPr lang="en-US" dirty="0"/>
           </a:p>
@@ -9212,7 +9213,7 @@
           <a:p>
             <a:fld id="{48A87A34-81AB-432B-8DAE-1953F412C126}" type="datetimeFigureOut">
               <a:rPr lang="en-US" smtClean="0"/>
-              <a:t>10/27/2023</a:t>
+              <a:t>10/28/2023</a:t>
             </a:fld>
             <a:endParaRPr lang="en-US" dirty="0"/>
           </a:p>
@@ -9492,7 +9493,7 @@
           <a:p>
             <a:fld id="{48A87A34-81AB-432B-8DAE-1953F412C126}" type="datetimeFigureOut">
               <a:rPr lang="en-US" smtClean="0"/>
-              <a:t>10/27/2023</a:t>
+              <a:t>10/28/2023</a:t>
             </a:fld>
             <a:endParaRPr lang="en-US" dirty="0"/>
           </a:p>
@@ -9615,7 +9616,7 @@
           <a:noFill/>
           <a:extLst>
             <a:ext uri="{909E8E84-426E-40dd-AFC4-6F175D3DCCD1}">
-              <a14:hiddenFill xmlns="" xmlns:a14="http://schemas.microsoft.com/office/drawing/2010/main">
+              <a14:hiddenFill xmlns:a14="http://schemas.microsoft.com/office/drawing/2010/main" xmlns="">
                 <a:solidFill>
                   <a:srgbClr val="FFFFFF"/>
                 </a:solidFill>
@@ -9689,7 +9690,7 @@
               </a:ln>
               <a:extLst>
                 <a:ext uri="{91240B29-F687-4f45-9708-019B960494DF}">
-                  <a14:hiddenLine xmlns="" xmlns:a14="http://schemas.microsoft.com/office/drawing/2010/main" w="9525">
+                  <a14:hiddenLine xmlns:a14="http://schemas.microsoft.com/office/drawing/2010/main" xmlns="" w="9525">
                     <a:solidFill>
                       <a:srgbClr val="000000"/>
                     </a:solidFill>
@@ -9779,7 +9780,7 @@
               </a:ln>
               <a:extLst>
                 <a:ext uri="{91240B29-F687-4f45-9708-019B960494DF}">
-                  <a14:hiddenLine xmlns="" xmlns:a14="http://schemas.microsoft.com/office/drawing/2010/main" w="9525">
+                  <a14:hiddenLine xmlns:a14="http://schemas.microsoft.com/office/drawing/2010/main" xmlns="" w="9525">
                     <a:solidFill>
                       <a:srgbClr val="000000"/>
                     </a:solidFill>
@@ -9869,7 +9870,7 @@
               </a:ln>
               <a:extLst>
                 <a:ext uri="{91240B29-F687-4f45-9708-019B960494DF}">
-                  <a14:hiddenLine xmlns="" xmlns:a14="http://schemas.microsoft.com/office/drawing/2010/main" w="9525">
+                  <a14:hiddenLine xmlns:a14="http://schemas.microsoft.com/office/drawing/2010/main" xmlns="" w="9525">
                     <a:solidFill>
                       <a:srgbClr val="000000"/>
                     </a:solidFill>
@@ -9931,7 +9932,7 @@
               </a:ln>
               <a:extLst>
                 <a:ext uri="{91240B29-F687-4f45-9708-019B960494DF}">
-                  <a14:hiddenLine xmlns="" xmlns:a14="http://schemas.microsoft.com/office/drawing/2010/main" w="9525">
+                  <a14:hiddenLine xmlns:a14="http://schemas.microsoft.com/office/drawing/2010/main" xmlns="" w="9525">
                     <a:solidFill>
                       <a:srgbClr val="000000"/>
                     </a:solidFill>
@@ -10021,7 +10022,7 @@
               </a:ln>
               <a:extLst>
                 <a:ext uri="{91240B29-F687-4f45-9708-019B960494DF}">
-                  <a14:hiddenLine xmlns="" xmlns:a14="http://schemas.microsoft.com/office/drawing/2010/main" w="9525">
+                  <a14:hiddenLine xmlns:a14="http://schemas.microsoft.com/office/drawing/2010/main" xmlns="" w="9525">
                     <a:solidFill>
                       <a:srgbClr val="000000"/>
                     </a:solidFill>
@@ -10083,7 +10084,7 @@
               </a:ln>
               <a:extLst>
                 <a:ext uri="{91240B29-F687-4f45-9708-019B960494DF}">
-                  <a14:hiddenLine xmlns="" xmlns:a14="http://schemas.microsoft.com/office/drawing/2010/main" w="9525">
+                  <a14:hiddenLine xmlns:a14="http://schemas.microsoft.com/office/drawing/2010/main" xmlns="" w="9525">
                     <a:solidFill>
                       <a:srgbClr val="000000"/>
                     </a:solidFill>
@@ -10145,7 +10146,7 @@
               </a:ln>
               <a:extLst>
                 <a:ext uri="{91240B29-F687-4f45-9708-019B960494DF}">
-                  <a14:hiddenLine xmlns="" xmlns:a14="http://schemas.microsoft.com/office/drawing/2010/main" w="9525">
+                  <a14:hiddenLine xmlns:a14="http://schemas.microsoft.com/office/drawing/2010/main" xmlns="" w="9525">
                     <a:solidFill>
                       <a:srgbClr val="000000"/>
                     </a:solidFill>
@@ -10235,7 +10236,7 @@
               </a:ln>
               <a:extLst>
                 <a:ext uri="{91240B29-F687-4f45-9708-019B960494DF}">
-                  <a14:hiddenLine xmlns="" xmlns:a14="http://schemas.microsoft.com/office/drawing/2010/main" w="9525">
+                  <a14:hiddenLine xmlns:a14="http://schemas.microsoft.com/office/drawing/2010/main" xmlns="" w="9525">
                     <a:solidFill>
                       <a:srgbClr val="000000"/>
                     </a:solidFill>
@@ -10325,7 +10326,7 @@
               </a:ln>
               <a:extLst>
                 <a:ext uri="{91240B29-F687-4f45-9708-019B960494DF}">
-                  <a14:hiddenLine xmlns="" xmlns:a14="http://schemas.microsoft.com/office/drawing/2010/main" w="9525">
+                  <a14:hiddenLine xmlns:a14="http://schemas.microsoft.com/office/drawing/2010/main" xmlns="" w="9525">
                     <a:solidFill>
                       <a:srgbClr val="000000"/>
                     </a:solidFill>
@@ -10387,7 +10388,7 @@
               </a:ln>
               <a:extLst>
                 <a:ext uri="{91240B29-F687-4f45-9708-019B960494DF}">
-                  <a14:hiddenLine xmlns="" xmlns:a14="http://schemas.microsoft.com/office/drawing/2010/main" w="9525">
+                  <a14:hiddenLine xmlns:a14="http://schemas.microsoft.com/office/drawing/2010/main" xmlns="" w="9525">
                     <a:solidFill>
                       <a:srgbClr val="000000"/>
                     </a:solidFill>
@@ -10497,7 +10498,7 @@
               </a:ln>
               <a:extLst>
                 <a:ext uri="{91240B29-F687-4f45-9708-019B960494DF}">
-                  <a14:hiddenLine xmlns="" xmlns:a14="http://schemas.microsoft.com/office/drawing/2010/main" w="9525">
+                  <a14:hiddenLine xmlns:a14="http://schemas.microsoft.com/office/drawing/2010/main" xmlns="" w="9525">
                     <a:solidFill>
                       <a:srgbClr val="000000"/>
                     </a:solidFill>
@@ -10581,7 +10582,7 @@
               </a:ln>
               <a:extLst>
                 <a:ext uri="{91240B29-F687-4f45-9708-019B960494DF}">
-                  <a14:hiddenLine xmlns="" xmlns:a14="http://schemas.microsoft.com/office/drawing/2010/main" w="9525">
+                  <a14:hiddenLine xmlns:a14="http://schemas.microsoft.com/office/drawing/2010/main" xmlns="" w="9525">
                     <a:solidFill>
                       <a:srgbClr val="000000"/>
                     </a:solidFill>
@@ -10643,7 +10644,7 @@
               </a:ln>
               <a:extLst>
                 <a:ext uri="{91240B29-F687-4f45-9708-019B960494DF}">
-                  <a14:hiddenLine xmlns="" xmlns:a14="http://schemas.microsoft.com/office/drawing/2010/main" w="9525">
+                  <a14:hiddenLine xmlns:a14="http://schemas.microsoft.com/office/drawing/2010/main" xmlns="" w="9525">
                     <a:solidFill>
                       <a:srgbClr val="000000"/>
                     </a:solidFill>
@@ -10705,7 +10706,7 @@
               </a:ln>
               <a:extLst>
                 <a:ext uri="{91240B29-F687-4f45-9708-019B960494DF}">
-                  <a14:hiddenLine xmlns="" xmlns:a14="http://schemas.microsoft.com/office/drawing/2010/main" w="9525">
+                  <a14:hiddenLine xmlns:a14="http://schemas.microsoft.com/office/drawing/2010/main" xmlns="" w="9525">
                     <a:solidFill>
                       <a:srgbClr val="000000"/>
                     </a:solidFill>
@@ -10795,7 +10796,7 @@
               </a:ln>
               <a:extLst>
                 <a:ext uri="{91240B29-F687-4f45-9708-019B960494DF}">
-                  <a14:hiddenLine xmlns="" xmlns:a14="http://schemas.microsoft.com/office/drawing/2010/main" w="9525">
+                  <a14:hiddenLine xmlns:a14="http://schemas.microsoft.com/office/drawing/2010/main" xmlns="" w="9525">
                     <a:solidFill>
                       <a:srgbClr val="000000"/>
                     </a:solidFill>
@@ -10829,7 +10830,7 @@
               </a:ln>
               <a:extLst>
                 <a:ext uri="{91240B29-F687-4f45-9708-019B960494DF}">
-                  <a14:hiddenLine xmlns="" xmlns:a14="http://schemas.microsoft.com/office/drawing/2010/main" w="9525">
+                  <a14:hiddenLine xmlns:a14="http://schemas.microsoft.com/office/drawing/2010/main" xmlns="" w="9525">
                     <a:solidFill>
                       <a:srgbClr val="000000"/>
                     </a:solidFill>
@@ -10894,7 +10895,7 @@
               </a:ln>
               <a:extLst>
                 <a:ext uri="{91240B29-F687-4f45-9708-019B960494DF}">
-                  <a14:hiddenLine xmlns="" xmlns:a14="http://schemas.microsoft.com/office/drawing/2010/main" w="9525">
+                  <a14:hiddenLine xmlns:a14="http://schemas.microsoft.com/office/drawing/2010/main" xmlns="" w="9525">
                     <a:solidFill>
                       <a:srgbClr val="000000"/>
                     </a:solidFill>
@@ -10984,7 +10985,7 @@
               </a:ln>
               <a:extLst>
                 <a:ext uri="{91240B29-F687-4f45-9708-019B960494DF}">
-                  <a14:hiddenLine xmlns="" xmlns:a14="http://schemas.microsoft.com/office/drawing/2010/main" w="9525">
+                  <a14:hiddenLine xmlns:a14="http://schemas.microsoft.com/office/drawing/2010/main" xmlns="" w="9525">
                     <a:solidFill>
                       <a:srgbClr val="000000"/>
                     </a:solidFill>
@@ -11046,7 +11047,7 @@
               </a:ln>
               <a:extLst>
                 <a:ext uri="{91240B29-F687-4f45-9708-019B960494DF}">
-                  <a14:hiddenLine xmlns="" xmlns:a14="http://schemas.microsoft.com/office/drawing/2010/main" w="9525">
+                  <a14:hiddenLine xmlns:a14="http://schemas.microsoft.com/office/drawing/2010/main" xmlns="" w="9525">
                     <a:solidFill>
                       <a:srgbClr val="000000"/>
                     </a:solidFill>
@@ -11136,7 +11137,7 @@
               </a:ln>
               <a:extLst>
                 <a:ext uri="{91240B29-F687-4f45-9708-019B960494DF}">
-                  <a14:hiddenLine xmlns="" xmlns:a14="http://schemas.microsoft.com/office/drawing/2010/main" w="9525">
+                  <a14:hiddenLine xmlns:a14="http://schemas.microsoft.com/office/drawing/2010/main" xmlns="" w="9525">
                     <a:solidFill>
                       <a:srgbClr val="000000"/>
                     </a:solidFill>
@@ -11201,7 +11202,7 @@
               </a:ln>
               <a:extLst>
                 <a:ext uri="{91240B29-F687-4f45-9708-019B960494DF}">
-                  <a14:hiddenLine xmlns="" xmlns:a14="http://schemas.microsoft.com/office/drawing/2010/main" w="9525">
+                  <a14:hiddenLine xmlns:a14="http://schemas.microsoft.com/office/drawing/2010/main" xmlns="" w="9525">
                     <a:solidFill>
                       <a:srgbClr val="000000"/>
                     </a:solidFill>
@@ -11263,7 +11264,7 @@
               </a:ln>
               <a:extLst>
                 <a:ext uri="{91240B29-F687-4f45-9708-019B960494DF}">
-                  <a14:hiddenLine xmlns="" xmlns:a14="http://schemas.microsoft.com/office/drawing/2010/main" w="9525">
+                  <a14:hiddenLine xmlns:a14="http://schemas.microsoft.com/office/drawing/2010/main" xmlns="" w="9525">
                     <a:solidFill>
                       <a:srgbClr val="000000"/>
                     </a:solidFill>
@@ -11353,7 +11354,7 @@
               </a:ln>
               <a:extLst>
                 <a:ext uri="{91240B29-F687-4f45-9708-019B960494DF}">
-                  <a14:hiddenLine xmlns="" xmlns:a14="http://schemas.microsoft.com/office/drawing/2010/main" w="9525">
+                  <a14:hiddenLine xmlns:a14="http://schemas.microsoft.com/office/drawing/2010/main" xmlns="" w="9525">
                     <a:solidFill>
                       <a:srgbClr val="000000"/>
                     </a:solidFill>
@@ -11443,7 +11444,7 @@
               </a:ln>
               <a:extLst>
                 <a:ext uri="{91240B29-F687-4f45-9708-019B960494DF}">
-                  <a14:hiddenLine xmlns="" xmlns:a14="http://schemas.microsoft.com/office/drawing/2010/main" w="9525">
+                  <a14:hiddenLine xmlns:a14="http://schemas.microsoft.com/office/drawing/2010/main" xmlns="" w="9525">
                     <a:solidFill>
                       <a:srgbClr val="000000"/>
                     </a:solidFill>
@@ -11508,7 +11509,7 @@
               </a:ln>
               <a:extLst>
                 <a:ext uri="{91240B29-F687-4f45-9708-019B960494DF}">
-                  <a14:hiddenLine xmlns="" xmlns:a14="http://schemas.microsoft.com/office/drawing/2010/main" w="9525">
+                  <a14:hiddenLine xmlns:a14="http://schemas.microsoft.com/office/drawing/2010/main" xmlns="" w="9525">
                     <a:solidFill>
                       <a:srgbClr val="000000"/>
                     </a:solidFill>
@@ -11628,7 +11629,7 @@
               </a:ln>
               <a:extLst>
                 <a:ext uri="{91240B29-F687-4f45-9708-019B960494DF}">
-                  <a14:hiddenLine xmlns="" xmlns:a14="http://schemas.microsoft.com/office/drawing/2010/main" w="9525">
+                  <a14:hiddenLine xmlns:a14="http://schemas.microsoft.com/office/drawing/2010/main" xmlns="" w="9525">
                     <a:solidFill>
                       <a:srgbClr val="000000"/>
                     </a:solidFill>
@@ -11709,7 +11710,7 @@
               </a:ln>
               <a:extLst>
                 <a:ext uri="{91240B29-F687-4f45-9708-019B960494DF}">
-                  <a14:hiddenLine xmlns="" xmlns:a14="http://schemas.microsoft.com/office/drawing/2010/main" w="9525">
+                  <a14:hiddenLine xmlns:a14="http://schemas.microsoft.com/office/drawing/2010/main" xmlns="" w="9525">
                     <a:solidFill>
                       <a:srgbClr val="000000"/>
                     </a:solidFill>
@@ -11824,7 +11825,7 @@
               </a:ln>
               <a:extLst>
                 <a:ext uri="{91240B29-F687-4f45-9708-019B960494DF}">
-                  <a14:hiddenLine xmlns="" xmlns:a14="http://schemas.microsoft.com/office/drawing/2010/main" w="9525">
+                  <a14:hiddenLine xmlns:a14="http://schemas.microsoft.com/office/drawing/2010/main" xmlns="" w="9525">
                     <a:solidFill>
                       <a:srgbClr val="000000"/>
                     </a:solidFill>
@@ -11914,7 +11915,7 @@
               </a:ln>
               <a:extLst>
                 <a:ext uri="{91240B29-F687-4f45-9708-019B960494DF}">
-                  <a14:hiddenLine xmlns="" xmlns:a14="http://schemas.microsoft.com/office/drawing/2010/main" w="9525">
+                  <a14:hiddenLine xmlns:a14="http://schemas.microsoft.com/office/drawing/2010/main" xmlns="" w="9525">
                     <a:solidFill>
                       <a:srgbClr val="000000"/>
                     </a:solidFill>
@@ -11979,7 +11980,7 @@
               </a:ln>
               <a:extLst>
                 <a:ext uri="{91240B29-F687-4f45-9708-019B960494DF}">
-                  <a14:hiddenLine xmlns="" xmlns:a14="http://schemas.microsoft.com/office/drawing/2010/main" w="9525">
+                  <a14:hiddenLine xmlns:a14="http://schemas.microsoft.com/office/drawing/2010/main" xmlns="" w="9525">
                     <a:solidFill>
                       <a:srgbClr val="000000"/>
                     </a:solidFill>
@@ -12069,7 +12070,7 @@
               </a:ln>
               <a:extLst>
                 <a:ext uri="{91240B29-F687-4f45-9708-019B960494DF}">
-                  <a14:hiddenLine xmlns="" xmlns:a14="http://schemas.microsoft.com/office/drawing/2010/main" w="9525">
+                  <a14:hiddenLine xmlns:a14="http://schemas.microsoft.com/office/drawing/2010/main" xmlns="" w="9525">
                     <a:solidFill>
                       <a:srgbClr val="000000"/>
                     </a:solidFill>
@@ -12137,7 +12138,7 @@
               </a:ln>
               <a:extLst>
                 <a:ext uri="{91240B29-F687-4f45-9708-019B960494DF}">
-                  <a14:hiddenLine xmlns="" xmlns:a14="http://schemas.microsoft.com/office/drawing/2010/main" w="9525">
+                  <a14:hiddenLine xmlns:a14="http://schemas.microsoft.com/office/drawing/2010/main" xmlns="" w="9525">
                     <a:solidFill>
                       <a:srgbClr val="000000"/>
                     </a:solidFill>
@@ -12227,7 +12228,7 @@
               </a:ln>
               <a:extLst>
                 <a:ext uri="{91240B29-F687-4f45-9708-019B960494DF}">
-                  <a14:hiddenLine xmlns="" xmlns:a14="http://schemas.microsoft.com/office/drawing/2010/main" w="9525">
+                  <a14:hiddenLine xmlns:a14="http://schemas.microsoft.com/office/drawing/2010/main" xmlns="" w="9525">
                     <a:solidFill>
                       <a:srgbClr val="000000"/>
                     </a:solidFill>
@@ -12295,7 +12296,7 @@
               </a:ln>
               <a:extLst>
                 <a:ext uri="{91240B29-F687-4f45-9708-019B960494DF}">
-                  <a14:hiddenLine xmlns="" xmlns:a14="http://schemas.microsoft.com/office/drawing/2010/main" w="9525">
+                  <a14:hiddenLine xmlns:a14="http://schemas.microsoft.com/office/drawing/2010/main" xmlns="" w="9525">
                     <a:solidFill>
                       <a:srgbClr val="000000"/>
                     </a:solidFill>
@@ -12385,7 +12386,7 @@
               </a:ln>
               <a:extLst>
                 <a:ext uri="{91240B29-F687-4f45-9708-019B960494DF}">
-                  <a14:hiddenLine xmlns="" xmlns:a14="http://schemas.microsoft.com/office/drawing/2010/main" w="9525">
+                  <a14:hiddenLine xmlns:a14="http://schemas.microsoft.com/office/drawing/2010/main" xmlns="" w="9525">
                     <a:solidFill>
                       <a:srgbClr val="000000"/>
                     </a:solidFill>
@@ -12419,7 +12420,7 @@
               </a:ln>
               <a:extLst>
                 <a:ext uri="{91240B29-F687-4f45-9708-019B960494DF}">
-                  <a14:hiddenLine xmlns="" xmlns:a14="http://schemas.microsoft.com/office/drawing/2010/main" w="9525">
+                  <a14:hiddenLine xmlns:a14="http://schemas.microsoft.com/office/drawing/2010/main" xmlns="" w="9525">
                     <a:solidFill>
                       <a:srgbClr val="000000"/>
                     </a:solidFill>
@@ -12560,7 +12561,7 @@
             <a:fld id="{48A87A34-81AB-432B-8DAE-1953F412C126}" type="datetimeFigureOut">
               <a:rPr lang="en-US" smtClean="0"/>
               <a:pPr/>
-              <a:t>10/27/2023</a:t>
+              <a:t>10/28/2023</a:t>
             </a:fld>
             <a:endParaRPr lang="en-US" dirty="0"/>
           </a:p>
@@ -13368,6 +13369,442 @@
     <p:extLst>
       <p:ext uri="{BB962C8B-B14F-4D97-AF65-F5344CB8AC3E}">
         <p14:creationId xmlns:p14="http://schemas.microsoft.com/office/powerpoint/2010/main" val="1819359268"/>
+      </p:ext>
+    </p:extLst>
+  </p:cSld>
+  <p:clrMapOvr>
+    <a:masterClrMapping/>
+  </p:clrMapOvr>
+</p:sld>
+</file>
+
+<file path=ppt/slides/slide2.xml><?xml version="1.0" encoding="utf-8"?>
+<p:sld xmlns:a="http://schemas.openxmlformats.org/drawingml/2006/main" xmlns:r="http://schemas.openxmlformats.org/officeDocument/2006/relationships" xmlns:p="http://schemas.openxmlformats.org/presentationml/2006/main">
+  <p:cSld>
+    <p:spTree>
+      <p:nvGrpSpPr>
+        <p:cNvPr id="1" name=""/>
+        <p:cNvGrpSpPr/>
+        <p:nvPr/>
+      </p:nvGrpSpPr>
+      <p:grpSpPr>
+        <a:xfrm>
+          <a:off x="0" y="0"/>
+          <a:ext cx="0" cy="0"/>
+          <a:chOff x="0" y="0"/>
+          <a:chExt cx="0" cy="0"/>
+        </a:xfrm>
+      </p:grpSpPr>
+      <p:sp>
+        <p:nvSpPr>
+          <p:cNvPr id="2" name="Title 1">
+            <a:extLst>
+              <a:ext uri="{FF2B5EF4-FFF2-40B4-BE49-F238E27FC236}">
+                <a16:creationId xmlns:a16="http://schemas.microsoft.com/office/drawing/2014/main" id="{8268D3E5-C7A3-47DF-A374-46BF83A69904}"/>
+              </a:ext>
+            </a:extLst>
+          </p:cNvPr>
+          <p:cNvSpPr>
+            <a:spLocks noGrp="1"/>
+          </p:cNvSpPr>
+          <p:nvPr>
+            <p:ph type="ctrTitle"/>
+          </p:nvPr>
+        </p:nvSpPr>
+        <p:spPr>
+          <a:xfrm>
+            <a:off x="1529862" y="1122363"/>
+            <a:ext cx="6479931" cy="2060452"/>
+          </a:xfrm>
+        </p:spPr>
+        <p:txBody>
+          <a:bodyPr anchor="ctr" anchorCtr="0">
+            <a:normAutofit/>
+          </a:bodyPr>
+          <a:lstStyle/>
+          <a:p>
+            <a:pPr algn="ctr"/>
+            <a:r>
+              <a:rPr lang="en-US" cap="none" dirty="0">
+                <a:latin typeface="ADLaM Display" panose="02010000000000000000" pitchFamily="2" charset="0"/>
+                <a:ea typeface="ADLaM Display" panose="02010000000000000000" pitchFamily="2" charset="0"/>
+                <a:cs typeface="ADLaM Display" panose="02010000000000000000" pitchFamily="2" charset="0"/>
+              </a:rPr>
+              <a:t>Learning </a:t>
+            </a:r>
+            <a:r>
+              <a:rPr lang="en-US" sz="6700" cap="none" dirty="0">
+                <a:latin typeface="ADLaM Display" panose="02010000000000000000" pitchFamily="2" charset="0"/>
+                <a:ea typeface="ADLaM Display" panose="02010000000000000000" pitchFamily="2" charset="0"/>
+                <a:cs typeface="ADLaM Display" panose="02010000000000000000" pitchFamily="2" charset="0"/>
+              </a:rPr>
+              <a:t>Octave</a:t>
+            </a:r>
+            <a:r>
+              <a:rPr lang="en-US" cap="none" dirty="0">
+                <a:latin typeface="ADLaM Display" panose="02010000000000000000" pitchFamily="2" charset="0"/>
+                <a:ea typeface="ADLaM Display" panose="02010000000000000000" pitchFamily="2" charset="0"/>
+                <a:cs typeface="ADLaM Display" panose="02010000000000000000" pitchFamily="2" charset="0"/>
+              </a:rPr>
+              <a:t> through Practicing</a:t>
+            </a:r>
+          </a:p>
+        </p:txBody>
+      </p:sp>
+      <p:sp>
+        <p:nvSpPr>
+          <p:cNvPr id="3" name="Subtitle 2">
+            <a:extLst>
+              <a:ext uri="{FF2B5EF4-FFF2-40B4-BE49-F238E27FC236}">
+                <a16:creationId xmlns:a16="http://schemas.microsoft.com/office/drawing/2014/main" id="{2E78725B-6E40-4D82-B375-7831D81C29EE}"/>
+              </a:ext>
+            </a:extLst>
+          </p:cNvPr>
+          <p:cNvSpPr>
+            <a:spLocks noGrp="1"/>
+          </p:cNvSpPr>
+          <p:nvPr>
+            <p:ph type="subTitle" idx="1"/>
+          </p:nvPr>
+        </p:nvSpPr>
+        <p:spPr>
+          <a:xfrm>
+            <a:off x="2166572" y="4410930"/>
+            <a:ext cx="4682636" cy="750154"/>
+          </a:xfrm>
+        </p:spPr>
+        <p:txBody>
+          <a:bodyPr>
+            <a:normAutofit fontScale="62500" lnSpcReduction="20000"/>
+          </a:bodyPr>
+          <a:lstStyle/>
+          <a:p>
+            <a:pPr algn="ctr"/>
+            <a:r>
+              <a:rPr lang="en-US" sz="3200" cap="none" dirty="0">
+                <a:latin typeface="ADLaM Display" panose="02010000000000000000" pitchFamily="2" charset="0"/>
+                <a:ea typeface="ADLaM Display" panose="02010000000000000000" pitchFamily="2" charset="0"/>
+                <a:cs typeface="ADLaM Display" panose="02010000000000000000" pitchFamily="2" charset="0"/>
+              </a:rPr>
+              <a:t>#002 – Simple Examples in Octave</a:t>
+            </a:r>
+          </a:p>
+        </p:txBody>
+      </p:sp>
+      <p:pic>
+        <p:nvPicPr>
+          <p:cNvPr id="5" name="Picture 4">
+            <a:extLst>
+              <a:ext uri="{FF2B5EF4-FFF2-40B4-BE49-F238E27FC236}">
+                <a16:creationId xmlns:a16="http://schemas.microsoft.com/office/drawing/2014/main" id="{4D4C62D8-65AD-31BE-9056-92174C5CA52E}"/>
+              </a:ext>
+            </a:extLst>
+          </p:cNvPr>
+          <p:cNvPicPr>
+            <a:picLocks noChangeAspect="1"/>
+          </p:cNvPicPr>
+          <p:nvPr/>
+        </p:nvPicPr>
+        <p:blipFill>
+          <a:blip r:embed="rId2"/>
+          <a:stretch>
+            <a:fillRect/>
+          </a:stretch>
+        </p:blipFill>
+        <p:spPr>
+          <a:xfrm>
+            <a:off x="1134208" y="744293"/>
+            <a:ext cx="2924175" cy="676275"/>
+          </a:xfrm>
+          <a:prstGeom prst="roundRect">
+            <a:avLst>
+              <a:gd name="adj" fmla="val 8594"/>
+            </a:avLst>
+          </a:prstGeom>
+          <a:solidFill>
+            <a:srgbClr val="FFFFFF">
+              <a:shade val="85000"/>
+            </a:srgbClr>
+          </a:solidFill>
+          <a:ln>
+            <a:noFill/>
+          </a:ln>
+          <a:effectLst>
+            <a:reflection blurRad="12700" stA="38000" endPos="28000" dist="5000" dir="5400000" sy="-100000" algn="bl" rotWithShape="0"/>
+          </a:effectLst>
+        </p:spPr>
+      </p:pic>
+      <p:sp>
+        <p:nvSpPr>
+          <p:cNvPr id="8" name="Subtitle 2">
+            <a:extLst>
+              <a:ext uri="{FF2B5EF4-FFF2-40B4-BE49-F238E27FC236}">
+                <a16:creationId xmlns:a16="http://schemas.microsoft.com/office/drawing/2014/main" id="{4052C537-F06C-A6CE-368B-561D4B22D951}"/>
+              </a:ext>
+            </a:extLst>
+          </p:cNvPr>
+          <p:cNvSpPr txBox="1">
+            <a:spLocks/>
+          </p:cNvSpPr>
+          <p:nvPr/>
+        </p:nvSpPr>
+        <p:spPr>
+          <a:xfrm>
+            <a:off x="1994712" y="5721228"/>
+            <a:ext cx="8683136" cy="750154"/>
+          </a:xfrm>
+          <a:prstGeom prst="rect">
+            <a:avLst/>
+          </a:prstGeom>
+        </p:spPr>
+        <p:txBody>
+          <a:bodyPr vert="horz" lIns="91440" tIns="45720" rIns="91440" bIns="45720" rtlCol="0">
+            <a:normAutofit fontScale="85000" lnSpcReduction="10000"/>
+          </a:bodyPr>
+          <a:lstStyle>
+            <a:lvl1pPr marL="0" indent="0" algn="l" defTabSz="914400" rtl="0" eaLnBrk="1" latinLnBrk="0" hangingPunct="1">
+              <a:lnSpc>
+                <a:spcPct val="120000"/>
+              </a:lnSpc>
+              <a:spcBef>
+                <a:spcPts val="1000"/>
+              </a:spcBef>
+              <a:buSzPct val="125000"/>
+              <a:buFont typeface="Arial" panose="020B0604020202020204" pitchFamily="34" charset="0"/>
+              <a:buNone/>
+              <a:defRPr sz="2000" kern="1200" cap="all" baseline="0">
+                <a:solidFill>
+                  <a:schemeClr val="tx2"/>
+                </a:solidFill>
+                <a:latin typeface="+mn-lt"/>
+                <a:ea typeface="+mn-ea"/>
+                <a:cs typeface="+mn-cs"/>
+              </a:defRPr>
+            </a:lvl1pPr>
+            <a:lvl2pPr marL="457200" indent="0" algn="ctr" defTabSz="914400" rtl="0" eaLnBrk="1" latinLnBrk="0" hangingPunct="1">
+              <a:lnSpc>
+                <a:spcPct val="120000"/>
+              </a:lnSpc>
+              <a:spcBef>
+                <a:spcPts val="500"/>
+              </a:spcBef>
+              <a:buSzPct val="125000"/>
+              <a:buFont typeface="Arial" panose="020B0604020202020204" pitchFamily="34" charset="0"/>
+              <a:buNone/>
+              <a:defRPr sz="2000" kern="1200">
+                <a:solidFill>
+                  <a:schemeClr val="tx1"/>
+                </a:solidFill>
+                <a:latin typeface="+mn-lt"/>
+                <a:ea typeface="+mn-ea"/>
+                <a:cs typeface="+mn-cs"/>
+              </a:defRPr>
+            </a:lvl2pPr>
+            <a:lvl3pPr marL="914400" indent="0" algn="ctr" defTabSz="914400" rtl="0" eaLnBrk="1" latinLnBrk="0" hangingPunct="1">
+              <a:lnSpc>
+                <a:spcPct val="120000"/>
+              </a:lnSpc>
+              <a:spcBef>
+                <a:spcPts val="500"/>
+              </a:spcBef>
+              <a:buSzPct val="125000"/>
+              <a:buFont typeface="Arial" panose="020B0604020202020204" pitchFamily="34" charset="0"/>
+              <a:buNone/>
+              <a:defRPr sz="1800" kern="1200">
+                <a:solidFill>
+                  <a:schemeClr val="tx1"/>
+                </a:solidFill>
+                <a:latin typeface="+mn-lt"/>
+                <a:ea typeface="+mn-ea"/>
+                <a:cs typeface="+mn-cs"/>
+              </a:defRPr>
+            </a:lvl3pPr>
+            <a:lvl4pPr marL="1371600" indent="0" algn="ctr" defTabSz="914400" rtl="0" eaLnBrk="1" latinLnBrk="0" hangingPunct="1">
+              <a:lnSpc>
+                <a:spcPct val="120000"/>
+              </a:lnSpc>
+              <a:spcBef>
+                <a:spcPts val="500"/>
+              </a:spcBef>
+              <a:buSzPct val="125000"/>
+              <a:buFont typeface="Arial" panose="020B0604020202020204" pitchFamily="34" charset="0"/>
+              <a:buNone/>
+              <a:defRPr sz="1600" kern="1200">
+                <a:solidFill>
+                  <a:schemeClr val="tx1"/>
+                </a:solidFill>
+                <a:latin typeface="+mn-lt"/>
+                <a:ea typeface="+mn-ea"/>
+                <a:cs typeface="+mn-cs"/>
+              </a:defRPr>
+            </a:lvl4pPr>
+            <a:lvl5pPr marL="1828800" indent="0" algn="ctr" defTabSz="914400" rtl="0" eaLnBrk="1" latinLnBrk="0" hangingPunct="1">
+              <a:lnSpc>
+                <a:spcPct val="120000"/>
+              </a:lnSpc>
+              <a:spcBef>
+                <a:spcPts val="500"/>
+              </a:spcBef>
+              <a:buSzPct val="125000"/>
+              <a:buFont typeface="Arial" panose="020B0604020202020204" pitchFamily="34" charset="0"/>
+              <a:buNone/>
+              <a:defRPr sz="1600" kern="1200">
+                <a:solidFill>
+                  <a:schemeClr val="tx1"/>
+                </a:solidFill>
+                <a:latin typeface="+mn-lt"/>
+                <a:ea typeface="+mn-ea"/>
+                <a:cs typeface="+mn-cs"/>
+              </a:defRPr>
+            </a:lvl5pPr>
+            <a:lvl6pPr marL="2286000" indent="0" algn="ctr" defTabSz="914400" rtl="0" eaLnBrk="1" latinLnBrk="0" hangingPunct="1">
+              <a:lnSpc>
+                <a:spcPct val="120000"/>
+              </a:lnSpc>
+              <a:spcBef>
+                <a:spcPts val="500"/>
+              </a:spcBef>
+              <a:buSzPct val="125000"/>
+              <a:buFont typeface="Arial" panose="020B0604020202020204" pitchFamily="34" charset="0"/>
+              <a:buNone/>
+              <a:defRPr sz="1600" kern="1200">
+                <a:solidFill>
+                  <a:schemeClr val="tx1"/>
+                </a:solidFill>
+                <a:latin typeface="+mn-lt"/>
+                <a:ea typeface="+mn-ea"/>
+                <a:cs typeface="+mn-cs"/>
+              </a:defRPr>
+            </a:lvl6pPr>
+            <a:lvl7pPr marL="2743200" indent="0" algn="ctr" defTabSz="914400" rtl="0" eaLnBrk="1" latinLnBrk="0" hangingPunct="1">
+              <a:lnSpc>
+                <a:spcPct val="120000"/>
+              </a:lnSpc>
+              <a:spcBef>
+                <a:spcPts val="500"/>
+              </a:spcBef>
+              <a:buSzPct val="125000"/>
+              <a:buFont typeface="Arial" panose="020B0604020202020204" pitchFamily="34" charset="0"/>
+              <a:buNone/>
+              <a:defRPr sz="1600" kern="1200">
+                <a:solidFill>
+                  <a:schemeClr val="tx1"/>
+                </a:solidFill>
+                <a:latin typeface="+mn-lt"/>
+                <a:ea typeface="+mn-ea"/>
+                <a:cs typeface="+mn-cs"/>
+              </a:defRPr>
+            </a:lvl7pPr>
+            <a:lvl8pPr marL="3200400" indent="0" algn="ctr" defTabSz="914400" rtl="0" eaLnBrk="1" latinLnBrk="0" hangingPunct="1">
+              <a:lnSpc>
+                <a:spcPct val="120000"/>
+              </a:lnSpc>
+              <a:spcBef>
+                <a:spcPts val="500"/>
+              </a:spcBef>
+              <a:buSzPct val="125000"/>
+              <a:buFont typeface="Arial" panose="020B0604020202020204" pitchFamily="34" charset="0"/>
+              <a:buNone/>
+              <a:defRPr sz="1600" kern="1200">
+                <a:solidFill>
+                  <a:schemeClr val="tx1"/>
+                </a:solidFill>
+                <a:latin typeface="+mn-lt"/>
+                <a:ea typeface="+mn-ea"/>
+                <a:cs typeface="+mn-cs"/>
+              </a:defRPr>
+            </a:lvl8pPr>
+            <a:lvl9pPr marL="3657600" indent="0" algn="ctr" defTabSz="914400" rtl="0" eaLnBrk="1" latinLnBrk="0" hangingPunct="1">
+              <a:lnSpc>
+                <a:spcPct val="120000"/>
+              </a:lnSpc>
+              <a:spcBef>
+                <a:spcPts val="500"/>
+              </a:spcBef>
+              <a:buSzPct val="125000"/>
+              <a:buFont typeface="Arial" panose="020B0604020202020204" pitchFamily="34" charset="0"/>
+              <a:buNone/>
+              <a:defRPr sz="1600" kern="1200">
+                <a:solidFill>
+                  <a:schemeClr val="tx1"/>
+                </a:solidFill>
+                <a:latin typeface="+mn-lt"/>
+                <a:ea typeface="+mn-ea"/>
+                <a:cs typeface="+mn-cs"/>
+              </a:defRPr>
+            </a:lvl9pPr>
+          </a:lstStyle>
+          <a:p>
+            <a:pPr algn="ctr"/>
+            <a:r>
+              <a:rPr lang="en-US" sz="3200" cap="none" dirty="0">
+                <a:latin typeface="ADLaM Display" panose="02010000000000000000" pitchFamily="2" charset="0"/>
+                <a:ea typeface="ADLaM Display" panose="02010000000000000000" pitchFamily="2" charset="0"/>
+                <a:cs typeface="ADLaM Display" panose="02010000000000000000" pitchFamily="2" charset="0"/>
+              </a:rPr>
+              <a:t>GitHub: </a:t>
+            </a:r>
+            <a:r>
+              <a:rPr lang="en-US" sz="3200" cap="none" dirty="0">
+                <a:latin typeface="ADLaM Display" panose="02010000000000000000" pitchFamily="2" charset="0"/>
+                <a:ea typeface="ADLaM Display" panose="02010000000000000000" pitchFamily="2" charset="0"/>
+                <a:cs typeface="ADLaM Display" panose="02010000000000000000" pitchFamily="2" charset="0"/>
+                <a:hlinkClick r:id="rId3"/>
+              </a:rPr>
+              <a:t>https://github.com/yasenstar/learn_octave</a:t>
+            </a:r>
+            <a:endParaRPr lang="en-US" sz="3200" cap="none" dirty="0">
+              <a:latin typeface="ADLaM Display" panose="02010000000000000000" pitchFamily="2" charset="0"/>
+              <a:ea typeface="ADLaM Display" panose="02010000000000000000" pitchFamily="2" charset="0"/>
+              <a:cs typeface="ADLaM Display" panose="02010000000000000000" pitchFamily="2" charset="0"/>
+            </a:endParaRPr>
+          </a:p>
+        </p:txBody>
+      </p:sp>
+      <p:pic>
+        <p:nvPicPr>
+          <p:cNvPr id="6" name="Picture 5">
+            <a:extLst>
+              <a:ext uri="{FF2B5EF4-FFF2-40B4-BE49-F238E27FC236}">
+                <a16:creationId xmlns:a16="http://schemas.microsoft.com/office/drawing/2014/main" id="{B5CA81E1-0DB4-2219-9065-C12BA1633428}"/>
+              </a:ext>
+            </a:extLst>
+          </p:cNvPr>
+          <p:cNvPicPr>
+            <a:picLocks noChangeAspect="1"/>
+          </p:cNvPicPr>
+          <p:nvPr/>
+        </p:nvPicPr>
+        <p:blipFill>
+          <a:blip r:embed="rId4"/>
+          <a:stretch>
+            <a:fillRect/>
+          </a:stretch>
+        </p:blipFill>
+        <p:spPr>
+          <a:xfrm>
+            <a:off x="7784500" y="981685"/>
+            <a:ext cx="4160293" cy="4179399"/>
+          </a:xfrm>
+          <a:prstGeom prst="rect">
+            <a:avLst/>
+          </a:prstGeom>
+          <a:ln>
+            <a:noFill/>
+          </a:ln>
+          <a:effectLst>
+            <a:outerShdw blurRad="292100" dist="139700" dir="2700000" algn="tl" rotWithShape="0">
+              <a:srgbClr val="333333">
+                <a:alpha val="65000"/>
+              </a:srgbClr>
+            </a:outerShdw>
+          </a:effectLst>
+        </p:spPr>
+      </p:pic>
+    </p:spTree>
+    <p:extLst>
+      <p:ext uri="{BB962C8B-B14F-4D97-AF65-F5344CB8AC3E}">
+        <p14:creationId xmlns:p14="http://schemas.microsoft.com/office/powerpoint/2010/main" val="4254586006"/>
       </p:ext>
     </p:extLst>
   </p:cSld>
@@ -14219,23 +14656,6 @@
 </file>
 
 <file path=customXml/item1.xml><?xml version="1.0" encoding="utf-8"?>
-<p:properties xmlns:p="http://schemas.microsoft.com/office/2006/metadata/properties" xmlns:xsi="http://www.w3.org/2001/XMLSchema-instance" xmlns:pc="http://schemas.microsoft.com/office/infopath/2007/PartnerControls">
-  <documentManagement>
-    <MediaServiceKeyPoints xmlns="71af3243-3dd4-4a8d-8c0d-dd76da1f02a5" xsi:nil="true"/>
-  </documentManagement>
-</p:properties>
-</file>
-
-<file path=customXml/item2.xml><?xml version="1.0" encoding="utf-8"?>
-<?mso-contentType ?>
-<FormTemplates xmlns="http://schemas.microsoft.com/sharepoint/v3/contenttype/forms">
-  <Display>DocumentLibraryForm</Display>
-  <Edit>DocumentLibraryForm</Edit>
-  <New>DocumentLibraryForm</New>
-</FormTemplates>
-</file>
-
-<file path=customXml/item3.xml><?xml version="1.0" encoding="utf-8"?>
 <ct:contentTypeSchema xmlns:ct="http://schemas.microsoft.com/office/2006/metadata/contentType" xmlns:ma="http://schemas.microsoft.com/office/2006/metadata/properties/metaAttributes" ct:_="" ma:_="" ma:contentTypeName="Document" ma:contentTypeID="0x01010079F111ED35F8CC479449609E8A0923A6" ma:contentTypeVersion="11" ma:contentTypeDescription="Create a new document." ma:contentTypeScope="" ma:versionID="96291512c1ee715ab617f4c07df79fc1">
   <xsd:schema xmlns:xsd="http://www.w3.org/2001/XMLSchema" xmlns:xs="http://www.w3.org/2001/XMLSchema" xmlns:p="http://schemas.microsoft.com/office/2006/metadata/properties" xmlns:ns2="71af3243-3dd4-4a8d-8c0d-dd76da1f02a5" xmlns:ns3="16c05727-aa75-4e4a-9b5f-8a80a1165891" targetNamespace="http://schemas.microsoft.com/office/2006/metadata/properties" ma:root="true" ma:fieldsID="8256c27c40ca5c40ce1cf6c44f0205df" ns2:_="" ns3:_="">
     <xsd:import namespace="71af3243-3dd4-4a8d-8c0d-dd76da1f02a5"/>
@@ -14446,25 +14866,24 @@
 </ct:contentTypeSchema>
 </file>
 
-<file path=customXml/itemProps1.xml><?xml version="1.0" encoding="utf-8"?>
-<ds:datastoreItem xmlns:ds="http://schemas.openxmlformats.org/officeDocument/2006/customXml" ds:itemID="{E7866CFD-F94E-4AE5-ACEA-86FEC0F48A10}">
-  <ds:schemaRefs>
-    <ds:schemaRef ds:uri="http://schemas.microsoft.com/office/2006/metadata/properties"/>
-    <ds:schemaRef ds:uri="http://schemas.microsoft.com/office/infopath/2007/PartnerControls"/>
-    <ds:schemaRef ds:uri="71af3243-3dd4-4a8d-8c0d-dd76da1f02a5"/>
-  </ds:schemaRefs>
-</ds:datastoreItem>
+<file path=customXml/item2.xml><?xml version="1.0" encoding="utf-8"?>
+<?mso-contentType ?>
+<FormTemplates xmlns="http://schemas.microsoft.com/sharepoint/v3/contenttype/forms">
+  <Display>DocumentLibraryForm</Display>
+  <Edit>DocumentLibraryForm</Edit>
+  <New>DocumentLibraryForm</New>
+</FormTemplates>
 </file>
 
-<file path=customXml/itemProps2.xml><?xml version="1.0" encoding="utf-8"?>
-<ds:datastoreItem xmlns:ds="http://schemas.openxmlformats.org/officeDocument/2006/customXml" ds:itemID="{B579702B-25C7-40D7-9E29-7686B11A9660}">
-  <ds:schemaRefs>
-    <ds:schemaRef ds:uri="http://schemas.microsoft.com/sharepoint/v3/contenttype/forms"/>
-  </ds:schemaRefs>
-</ds:datastoreItem>
+<file path=customXml/item3.xml><?xml version="1.0" encoding="utf-8"?>
+<p:properties xmlns:p="http://schemas.microsoft.com/office/2006/metadata/properties" xmlns:xsi="http://www.w3.org/2001/XMLSchema-instance" xmlns:pc="http://schemas.microsoft.com/office/infopath/2007/PartnerControls">
+  <documentManagement>
+    <MediaServiceKeyPoints xmlns="71af3243-3dd4-4a8d-8c0d-dd76da1f02a5" xsi:nil="true"/>
+  </documentManagement>
+</p:properties>
 </file>
 
-<file path=customXml/itemProps3.xml><?xml version="1.0" encoding="utf-8"?>
+<file path=customXml/itemProps1.xml><?xml version="1.0" encoding="utf-8"?>
 <ds:datastoreItem xmlns:ds="http://schemas.openxmlformats.org/officeDocument/2006/customXml" ds:itemID="{A7C0B241-13E5-418D-8920-D23491E2D2C0}">
   <ds:schemaRefs>
     <ds:schemaRef ds:uri="http://schemas.microsoft.com/office/2006/metadata/contentType"/>
@@ -14481,4 +14900,22 @@
     <ds:schemaRef ds:uri="http://schemas.microsoft.com/internal/obd"/>
   </ds:schemaRefs>
 </ds:datastoreItem>
+</file>
+
+<file path=customXml/itemProps2.xml><?xml version="1.0" encoding="utf-8"?>
+<ds:datastoreItem xmlns:ds="http://schemas.openxmlformats.org/officeDocument/2006/customXml" ds:itemID="{B579702B-25C7-40D7-9E29-7686B11A9660}">
+  <ds:schemaRefs>
+    <ds:schemaRef ds:uri="http://schemas.microsoft.com/sharepoint/v3/contenttype/forms"/>
+  </ds:schemaRefs>
+</ds:datastoreItem>
+</file>
+
+<file path=customXml/itemProps3.xml><?xml version="1.0" encoding="utf-8"?>
+<ds:datastoreItem xmlns:ds="http://schemas.openxmlformats.org/officeDocument/2006/customXml" ds:itemID="{E7866CFD-F94E-4AE5-ACEA-86FEC0F48A10}">
+  <ds:schemaRefs>
+    <ds:schemaRef ds:uri="http://schemas.microsoft.com/office/2006/metadata/properties"/>
+    <ds:schemaRef ds:uri="http://schemas.microsoft.com/office/infopath/2007/PartnerControls"/>
+    <ds:schemaRef ds:uri="71af3243-3dd4-4a8d-8c0d-dd76da1f02a5"/>
+  </ds:schemaRefs>
+</ds:datastoreItem>
 </file>
</xml_diff>